<commit_message>
modificacion del titulo de la presentacion
</commit_message>
<xml_diff>
--- a/Propuesta_QA_Testing_Inpact.pptx
+++ b/Propuesta_QA_Testing_Inpact.pptx
@@ -843,7 +843,7 @@
             <a:fld id="{B61BEF0D-F0BB-DE4B-95CE-6DB70DBA9567}" type="datetimeFigureOut">
               <a:rPr lang="en-US" dirty="0"/>
               <a:pPr/>
-              <a:t>11/5/2019</a:t>
+              <a:t>11/6/2019</a:t>
             </a:fld>
             <a:endParaRPr lang="en-US" dirty="0"/>
           </a:p>
@@ -1091,7 +1091,7 @@
             <a:fld id="{B61BEF0D-F0BB-DE4B-95CE-6DB70DBA9567}" type="datetimeFigureOut">
               <a:rPr lang="en-US" dirty="0"/>
               <a:pPr/>
-              <a:t>11/5/2019</a:t>
+              <a:t>11/6/2019</a:t>
             </a:fld>
             <a:endParaRPr lang="en-US" dirty="0"/>
           </a:p>
@@ -1402,7 +1402,7 @@
             <a:fld id="{B61BEF0D-F0BB-DE4B-95CE-6DB70DBA9567}" type="datetimeFigureOut">
               <a:rPr lang="en-US" dirty="0"/>
               <a:pPr/>
-              <a:t>11/5/2019</a:t>
+              <a:t>11/6/2019</a:t>
             </a:fld>
             <a:endParaRPr lang="en-US" dirty="0"/>
           </a:p>
@@ -1740,7 +1740,7 @@
             <a:fld id="{B61BEF0D-F0BB-DE4B-95CE-6DB70DBA9567}" type="datetimeFigureOut">
               <a:rPr lang="en-US" dirty="0"/>
               <a:pPr/>
-              <a:t>11/5/2019</a:t>
+              <a:t>11/6/2019</a:t>
             </a:fld>
             <a:endParaRPr lang="en-US" dirty="0"/>
           </a:p>
@@ -2051,7 +2051,7 @@
             <a:fld id="{B61BEF0D-F0BB-DE4B-95CE-6DB70DBA9567}" type="datetimeFigureOut">
               <a:rPr lang="en-US" dirty="0"/>
               <a:pPr/>
-              <a:t>11/5/2019</a:t>
+              <a:t>11/6/2019</a:t>
             </a:fld>
             <a:endParaRPr lang="en-US" dirty="0"/>
           </a:p>
@@ -2441,7 +2441,7 @@
             <a:fld id="{B61BEF0D-F0BB-DE4B-95CE-6DB70DBA9567}" type="datetimeFigureOut">
               <a:rPr lang="en-US" dirty="0"/>
               <a:pPr/>
-              <a:t>11/5/2019</a:t>
+              <a:t>11/6/2019</a:t>
             </a:fld>
             <a:endParaRPr lang="en-US" dirty="0"/>
           </a:p>
@@ -2607,7 +2607,7 @@
           <a:p>
             <a:fld id="{55C6B4A9-1611-4792-9094-5F34BCA07E0B}" type="datetimeFigureOut">
               <a:rPr lang="en-US" dirty="0"/>
-              <a:t>11/5/2019</a:t>
+              <a:t>11/6/2019</a:t>
             </a:fld>
             <a:endParaRPr lang="en-US" dirty="0"/>
           </a:p>
@@ -2783,7 +2783,7 @@
             <a:fld id="{B61BEF0D-F0BB-DE4B-95CE-6DB70DBA9567}" type="datetimeFigureOut">
               <a:rPr lang="en-US" dirty="0"/>
               <a:pPr/>
-              <a:t>11/5/2019</a:t>
+              <a:t>11/6/2019</a:t>
             </a:fld>
             <a:endParaRPr lang="en-US" dirty="0"/>
           </a:p>
@@ -2956,7 +2956,7 @@
             <a:fld id="{B61BEF0D-F0BB-DE4B-95CE-6DB70DBA9567}" type="datetimeFigureOut">
               <a:rPr lang="en-US" dirty="0"/>
               <a:pPr/>
-              <a:t>11/5/2019</a:t>
+              <a:t>11/6/2019</a:t>
             </a:fld>
             <a:endParaRPr lang="en-US" dirty="0"/>
           </a:p>
@@ -3200,7 +3200,7 @@
             <a:fld id="{B61BEF0D-F0BB-DE4B-95CE-6DB70DBA9567}" type="datetimeFigureOut">
               <a:rPr lang="en-US" dirty="0"/>
               <a:pPr/>
-              <a:t>11/5/2019</a:t>
+              <a:t>11/6/2019</a:t>
             </a:fld>
             <a:endParaRPr lang="en-US" dirty="0"/>
           </a:p>
@@ -3428,7 +3428,7 @@
           <a:p>
             <a:fld id="{EB712588-04B1-427B-82EE-E8DB90309F08}" type="datetimeFigureOut">
               <a:rPr lang="en-US" dirty="0"/>
-              <a:t>11/5/2019</a:t>
+              <a:t>11/6/2019</a:t>
             </a:fld>
             <a:endParaRPr lang="en-US" dirty="0"/>
           </a:p>
@@ -3798,7 +3798,7 @@
             <a:fld id="{B61BEF0D-F0BB-DE4B-95CE-6DB70DBA9567}" type="datetimeFigureOut">
               <a:rPr lang="en-US" dirty="0"/>
               <a:pPr/>
-              <a:t>11/5/2019</a:t>
+              <a:t>11/6/2019</a:t>
             </a:fld>
             <a:endParaRPr lang="en-US" dirty="0"/>
           </a:p>
@@ -3918,7 +3918,7 @@
             <a:fld id="{B61BEF0D-F0BB-DE4B-95CE-6DB70DBA9567}" type="datetimeFigureOut">
               <a:rPr lang="en-US" dirty="0"/>
               <a:pPr/>
-              <a:t>11/5/2019</a:t>
+              <a:t>11/6/2019</a:t>
             </a:fld>
             <a:endParaRPr lang="en-US" dirty="0"/>
           </a:p>
@@ -4010,7 +4010,7 @@
             <a:fld id="{B61BEF0D-F0BB-DE4B-95CE-6DB70DBA9567}" type="datetimeFigureOut">
               <a:rPr lang="en-US" dirty="0"/>
               <a:pPr/>
-              <a:t>11/5/2019</a:t>
+              <a:t>11/6/2019</a:t>
             </a:fld>
             <a:endParaRPr lang="en-US" dirty="0"/>
           </a:p>
@@ -4261,7 +4261,7 @@
           <a:p>
             <a:fld id="{42A54C80-263E-416B-A8E0-580EDEADCBDC}" type="datetimeFigureOut">
               <a:rPr lang="en-US" dirty="0"/>
-              <a:t>11/5/2019</a:t>
+              <a:t>11/6/2019</a:t>
             </a:fld>
             <a:endParaRPr lang="en-US" dirty="0"/>
           </a:p>
@@ -4520,7 +4520,7 @@
             <a:fld id="{B61BEF0D-F0BB-DE4B-95CE-6DB70DBA9567}" type="datetimeFigureOut">
               <a:rPr lang="en-US" dirty="0"/>
               <a:pPr/>
-              <a:t>11/5/2019</a:t>
+              <a:t>11/6/2019</a:t>
             </a:fld>
             <a:endParaRPr lang="en-US" dirty="0"/>
           </a:p>
@@ -5260,7 +5260,7 @@
             <a:fld id="{B61BEF0D-F0BB-DE4B-95CE-6DB70DBA9567}" type="datetimeFigureOut">
               <a:rPr lang="en-US" dirty="0"/>
               <a:pPr/>
-              <a:t>11/5/2019</a:t>
+              <a:t>11/6/2019</a:t>
             </a:fld>
             <a:endParaRPr lang="en-US" dirty="0"/>
           </a:p>
@@ -5810,12 +5810,12 @@
               <a:t>Testing</a:t>
             </a:r>
             <a:r>
-              <a:rPr lang="es-CL" dirty="0"/>
+              <a:rPr lang="es-CL"/>
               <a:t> </a:t>
             </a:r>
             <a:r>
-              <a:rPr lang="es-CL" dirty="0" err="1"/>
-              <a:t>Inpact</a:t>
+              <a:rPr lang="es-CL" smtClean="0"/>
+              <a:t>Inpact1</a:t>
             </a:r>
             <a:endParaRPr lang="en-US" dirty="0"/>
           </a:p>

</xml_diff>